<commit_message>
Bibliografía formateada y powerpoint con mi parte
Falta el enlace de Henry
</commit_message>
<xml_diff>
--- a/PresentacionTFM.pptx
+++ b/PresentacionTFM.pptx
@@ -16,6 +16,8 @@
     <p:sldId id="268" r:id="rId10"/>
     <p:sldId id="259" r:id="rId11"/>
     <p:sldId id="260" r:id="rId12"/>
+    <p:sldId id="269" r:id="rId13"/>
+    <p:sldId id="270" r:id="rId14"/>
   </p:sldIdLst>
   <p:sldSz cx="12192000" cy="6858000"/>
   <p:notesSz cx="6858000" cy="9144000"/>
@@ -114,7 +116,198 @@
       </a:defRPr>
     </a:lvl9pPr>
   </p:defaultTextStyle>
+  <p:extLst>
+    <p:ext uri="{EFAFB233-063F-42B5-8137-9DF3F51BA10A}">
+      <p15:sldGuideLst xmlns:p15="http://schemas.microsoft.com/office/powerpoint/2012/main"/>
+    </p:ext>
+  </p:extLst>
 </p:presentation>
+</file>
+
+<file path=ppt/changesInfos/changesInfo1.xml><?xml version="1.0" encoding="utf-8"?>
+<pc:chgInfo xmlns:a="http://schemas.openxmlformats.org/drawingml/2006/main" xmlns:r="http://schemas.openxmlformats.org/officeDocument/2006/relationships" xmlns:ac="http://schemas.microsoft.com/office/drawing/2013/main/command" xmlns:pc="http://schemas.microsoft.com/office/powerpoint/2013/main/command">
+  <pc:docChgLst>
+    <pc:chgData name="Delasao Delasao" userId="29c7d1ce3830647b" providerId="LiveId" clId="{0497A9FB-AE04-422C-8281-2E7D62733918}"/>
+    <pc:docChg chg="custSel addSld delSld modSld">
+      <pc:chgData name="Delasao Delasao" userId="29c7d1ce3830647b" providerId="LiveId" clId="{0497A9FB-AE04-422C-8281-2E7D62733918}" dt="2021-09-29T19:43:45.801" v="1000" actId="1076"/>
+      <pc:docMkLst>
+        <pc:docMk/>
+      </pc:docMkLst>
+      <pc:sldChg chg="addSp delSp modSp mod">
+        <pc:chgData name="Delasao Delasao" userId="29c7d1ce3830647b" providerId="LiveId" clId="{0497A9FB-AE04-422C-8281-2E7D62733918}" dt="2021-09-29T19:38:06.676" v="243" actId="1076"/>
+        <pc:sldMkLst>
+          <pc:docMk/>
+          <pc:sldMk cId="3183832166" sldId="260"/>
+        </pc:sldMkLst>
+        <pc:spChg chg="mod">
+          <ac:chgData name="Delasao Delasao" userId="29c7d1ce3830647b" providerId="LiveId" clId="{0497A9FB-AE04-422C-8281-2E7D62733918}" dt="2021-09-29T19:13:33.281" v="9" actId="20577"/>
+          <ac:spMkLst>
+            <pc:docMk/>
+            <pc:sldMk cId="3183832166" sldId="260"/>
+            <ac:spMk id="2" creationId="{382C1579-1660-4D0C-9EF8-2B0352D3B61D}"/>
+          </ac:spMkLst>
+        </pc:spChg>
+        <pc:spChg chg="del">
+          <ac:chgData name="Delasao Delasao" userId="29c7d1ce3830647b" providerId="LiveId" clId="{0497A9FB-AE04-422C-8281-2E7D62733918}" dt="2021-09-29T19:14:28.799" v="49" actId="478"/>
+          <ac:spMkLst>
+            <pc:docMk/>
+            <pc:sldMk cId="3183832166" sldId="260"/>
+            <ac:spMk id="3" creationId="{B5C35203-FF68-4B5F-B0C8-0DFBBEEE7F0D}"/>
+          </ac:spMkLst>
+        </pc:spChg>
+        <pc:spChg chg="add mod">
+          <ac:chgData name="Delasao Delasao" userId="29c7d1ce3830647b" providerId="LiveId" clId="{0497A9FB-AE04-422C-8281-2E7D62733918}" dt="2021-09-29T19:38:00.473" v="242" actId="20577"/>
+          <ac:spMkLst>
+            <pc:docMk/>
+            <pc:sldMk cId="3183832166" sldId="260"/>
+            <ac:spMk id="5" creationId="{63D45A89-A00D-458A-8126-A0372F28BDA6}"/>
+          </ac:spMkLst>
+        </pc:spChg>
+        <pc:picChg chg="add mod">
+          <ac:chgData name="Delasao Delasao" userId="29c7d1ce3830647b" providerId="LiveId" clId="{0497A9FB-AE04-422C-8281-2E7D62733918}" dt="2021-09-29T19:38:06.676" v="243" actId="1076"/>
+          <ac:picMkLst>
+            <pc:docMk/>
+            <pc:sldMk cId="3183832166" sldId="260"/>
+            <ac:picMk id="4" creationId="{F0B47B76-90E7-4CB7-BD85-0B7EB2A11EB6}"/>
+          </ac:picMkLst>
+        </pc:picChg>
+      </pc:sldChg>
+      <pc:sldChg chg="addSp delSp modSp add mod">
+        <pc:chgData name="Delasao Delasao" userId="29c7d1ce3830647b" providerId="LiveId" clId="{0497A9FB-AE04-422C-8281-2E7D62733918}" dt="2021-09-29T19:40:26.983" v="381" actId="1076"/>
+        <pc:sldMkLst>
+          <pc:docMk/>
+          <pc:sldMk cId="1142920165" sldId="269"/>
+        </pc:sldMkLst>
+        <pc:spChg chg="mod">
+          <ac:chgData name="Delasao Delasao" userId="29c7d1ce3830647b" providerId="LiveId" clId="{0497A9FB-AE04-422C-8281-2E7D62733918}" dt="2021-09-29T19:13:39.114" v="20" actId="20577"/>
+          <ac:spMkLst>
+            <pc:docMk/>
+            <pc:sldMk cId="1142920165" sldId="269"/>
+            <ac:spMk id="2" creationId="{382C1579-1660-4D0C-9EF8-2B0352D3B61D}"/>
+          </ac:spMkLst>
+        </pc:spChg>
+        <pc:spChg chg="del">
+          <ac:chgData name="Delasao Delasao" userId="29c7d1ce3830647b" providerId="LiveId" clId="{0497A9FB-AE04-422C-8281-2E7D62733918}" dt="2021-09-29T19:38:20.784" v="244" actId="478"/>
+          <ac:spMkLst>
+            <pc:docMk/>
+            <pc:sldMk cId="1142920165" sldId="269"/>
+            <ac:spMk id="3" creationId="{B5C35203-FF68-4B5F-B0C8-0DFBBEEE7F0D}"/>
+          </ac:spMkLst>
+        </pc:spChg>
+        <pc:spChg chg="add mod">
+          <ac:chgData name="Delasao Delasao" userId="29c7d1ce3830647b" providerId="LiveId" clId="{0497A9FB-AE04-422C-8281-2E7D62733918}" dt="2021-09-29T19:39:31.313" v="375" actId="20577"/>
+          <ac:spMkLst>
+            <pc:docMk/>
+            <pc:sldMk cId="1142920165" sldId="269"/>
+            <ac:spMk id="7" creationId="{46E36B8D-8643-480E-96EF-59A3C8BE260F}"/>
+          </ac:spMkLst>
+        </pc:spChg>
+        <pc:picChg chg="add del mod">
+          <ac:chgData name="Delasao Delasao" userId="29c7d1ce3830647b" providerId="LiveId" clId="{0497A9FB-AE04-422C-8281-2E7D62733918}" dt="2021-09-29T19:39:58.952" v="376" actId="478"/>
+          <ac:picMkLst>
+            <pc:docMk/>
+            <pc:sldMk cId="1142920165" sldId="269"/>
+            <ac:picMk id="4" creationId="{6EEB94D0-92C8-4C15-9851-0330F7620AE0}"/>
+          </ac:picMkLst>
+        </pc:picChg>
+        <pc:picChg chg="add del mod">
+          <ac:chgData name="Delasao Delasao" userId="29c7d1ce3830647b" providerId="LiveId" clId="{0497A9FB-AE04-422C-8281-2E7D62733918}" dt="2021-09-29T19:38:36.105" v="251" actId="478"/>
+          <ac:picMkLst>
+            <pc:docMk/>
+            <pc:sldMk cId="1142920165" sldId="269"/>
+            <ac:picMk id="5" creationId="{B4FF4977-D8B5-427A-9972-CF8E089C44AC}"/>
+          </ac:picMkLst>
+        </pc:picChg>
+        <pc:picChg chg="add mod">
+          <ac:chgData name="Delasao Delasao" userId="29c7d1ce3830647b" providerId="LiveId" clId="{0497A9FB-AE04-422C-8281-2E7D62733918}" dt="2021-09-29T19:38:48.398" v="255" actId="1076"/>
+          <ac:picMkLst>
+            <pc:docMk/>
+            <pc:sldMk cId="1142920165" sldId="269"/>
+            <ac:picMk id="6" creationId="{19A1DD0B-D38C-45B1-92D7-7B28267CE6EB}"/>
+          </ac:picMkLst>
+        </pc:picChg>
+        <pc:picChg chg="add mod">
+          <ac:chgData name="Delasao Delasao" userId="29c7d1ce3830647b" providerId="LiveId" clId="{0497A9FB-AE04-422C-8281-2E7D62733918}" dt="2021-09-29T19:40:26.983" v="381" actId="1076"/>
+          <ac:picMkLst>
+            <pc:docMk/>
+            <pc:sldMk cId="1142920165" sldId="269"/>
+            <ac:picMk id="1026" creationId="{1AFA8586-0C29-4254-AFB0-BA0073495519}"/>
+          </ac:picMkLst>
+        </pc:picChg>
+      </pc:sldChg>
+      <pc:sldChg chg="addSp delSp modSp add mod">
+        <pc:chgData name="Delasao Delasao" userId="29c7d1ce3830647b" providerId="LiveId" clId="{0497A9FB-AE04-422C-8281-2E7D62733918}" dt="2021-09-29T19:43:45.801" v="1000" actId="1076"/>
+        <pc:sldMkLst>
+          <pc:docMk/>
+          <pc:sldMk cId="2558987691" sldId="270"/>
+        </pc:sldMkLst>
+        <pc:spChg chg="mod">
+          <ac:chgData name="Delasao Delasao" userId="29c7d1ce3830647b" providerId="LiveId" clId="{0497A9FB-AE04-422C-8281-2E7D62733918}" dt="2021-09-29T19:40:51.264" v="398" actId="20577"/>
+          <ac:spMkLst>
+            <pc:docMk/>
+            <pc:sldMk cId="2558987691" sldId="270"/>
+            <ac:spMk id="2" creationId="{382C1579-1660-4D0C-9EF8-2B0352D3B61D}"/>
+          </ac:spMkLst>
+        </pc:spChg>
+        <pc:spChg chg="mod">
+          <ac:chgData name="Delasao Delasao" userId="29c7d1ce3830647b" providerId="LiveId" clId="{0497A9FB-AE04-422C-8281-2E7D62733918}" dt="2021-09-29T19:42:55.113" v="987" actId="1076"/>
+          <ac:spMkLst>
+            <pc:docMk/>
+            <pc:sldMk cId="2558987691" sldId="270"/>
+            <ac:spMk id="3" creationId="{B5C35203-FF68-4B5F-B0C8-0DFBBEEE7F0D}"/>
+          </ac:spMkLst>
+        </pc:spChg>
+        <pc:spChg chg="add mod">
+          <ac:chgData name="Delasao Delasao" userId="29c7d1ce3830647b" providerId="LiveId" clId="{0497A9FB-AE04-422C-8281-2E7D62733918}" dt="2021-09-29T19:43:45.801" v="1000" actId="1076"/>
+          <ac:spMkLst>
+            <pc:docMk/>
+            <pc:sldMk cId="2558987691" sldId="270"/>
+            <ac:spMk id="8" creationId="{51236801-5F83-484D-B546-4FB61C4E7B62}"/>
+          </ac:spMkLst>
+        </pc:spChg>
+        <pc:picChg chg="add mod">
+          <ac:chgData name="Delasao Delasao" userId="29c7d1ce3830647b" providerId="LiveId" clId="{0497A9FB-AE04-422C-8281-2E7D62733918}" dt="2021-09-29T19:43:21.157" v="996" actId="1076"/>
+          <ac:picMkLst>
+            <pc:docMk/>
+            <pc:sldMk cId="2558987691" sldId="270"/>
+            <ac:picMk id="4" creationId="{089535EA-B039-4098-9523-1336FA90CE45}"/>
+          </ac:picMkLst>
+        </pc:picChg>
+        <pc:picChg chg="add mod">
+          <ac:chgData name="Delasao Delasao" userId="29c7d1ce3830647b" providerId="LiveId" clId="{0497A9FB-AE04-422C-8281-2E7D62733918}" dt="2021-09-29T19:43:17.362" v="995" actId="1076"/>
+          <ac:picMkLst>
+            <pc:docMk/>
+            <pc:sldMk cId="2558987691" sldId="270"/>
+            <ac:picMk id="5" creationId="{54FDBDC1-466F-4307-A604-A30DEA35B2B2}"/>
+          </ac:picMkLst>
+        </pc:picChg>
+        <pc:cxnChg chg="add del">
+          <ac:chgData name="Delasao Delasao" userId="29c7d1ce3830647b" providerId="LiveId" clId="{0497A9FB-AE04-422C-8281-2E7D62733918}" dt="2021-09-29T19:43:33.936" v="998" actId="478"/>
+          <ac:cxnSpMkLst>
+            <pc:docMk/>
+            <pc:sldMk cId="2558987691" sldId="270"/>
+            <ac:cxnSpMk id="7" creationId="{CB2BF402-2B94-4B71-8A90-3526C6E200FC}"/>
+          </ac:cxnSpMkLst>
+        </pc:cxnChg>
+      </pc:sldChg>
+      <pc:sldChg chg="modSp add del mod">
+        <pc:chgData name="Delasao Delasao" userId="29c7d1ce3830647b" providerId="LiveId" clId="{0497A9FB-AE04-422C-8281-2E7D62733918}" dt="2021-09-29T19:40:54.862" v="399" actId="2696"/>
+        <pc:sldMkLst>
+          <pc:docMk/>
+          <pc:sldMk cId="4218750579" sldId="271"/>
+        </pc:sldMkLst>
+        <pc:spChg chg="mod">
+          <ac:chgData name="Delasao Delasao" userId="29c7d1ce3830647b" providerId="LiveId" clId="{0497A9FB-AE04-422C-8281-2E7D62733918}" dt="2021-09-29T19:13:54.185" v="48" actId="20577"/>
+          <ac:spMkLst>
+            <pc:docMk/>
+            <pc:sldMk cId="4218750579" sldId="271"/>
+            <ac:spMk id="2" creationId="{382C1579-1660-4D0C-9EF8-2B0352D3B61D}"/>
+          </ac:spMkLst>
+        </pc:spChg>
+      </pc:sldChg>
+    </pc:docChg>
+  </pc:docChgLst>
+</pc:chgInfo>
 </file>
 
 <file path=ppt/slideLayouts/slideLayout1.xml><?xml version="1.0" encoding="utf-8"?>
@@ -303,7 +496,7 @@
           <a:p>
             <a:fld id="{4AAD347D-5ACD-4C99-B74B-A9C85AD731AF}" type="datetimeFigureOut">
               <a:rPr lang="en-US" dirty="0"/>
-              <a:t>9/28/2021</a:t>
+              <a:t>9/29/2021</a:t>
             </a:fld>
             <a:endParaRPr lang="en-US" dirty="0"/>
           </a:p>
@@ -345,7 +538,7 @@
           <a:p>
             <a:fld id="{D57F1E4F-1CFF-5643-939E-02111984F565}" type="slidenum">
               <a:rPr lang="en-US" dirty="0"/>
-              <a:t>‹Nº›</a:t>
+              <a:t>‹#›</a:t>
             </a:fld>
             <a:endParaRPr lang="en-US" dirty="0"/>
           </a:p>
@@ -573,7 +766,7 @@
           <a:p>
             <a:fld id="{4509A250-FF31-4206-8172-F9D3106AACB1}" type="datetimeFigureOut">
               <a:rPr lang="en-US" dirty="0"/>
-              <a:t>9/28/2021</a:t>
+              <a:t>9/29/2021</a:t>
             </a:fld>
             <a:endParaRPr lang="en-US" dirty="0"/>
           </a:p>
@@ -615,7 +808,7 @@
           <a:p>
             <a:fld id="{D57F1E4F-1CFF-5643-939E-02111984F565}" type="slidenum">
               <a:rPr lang="en-US" dirty="0"/>
-              <a:t>‹Nº›</a:t>
+              <a:t>‹#›</a:t>
             </a:fld>
             <a:endParaRPr lang="en-US" dirty="0"/>
           </a:p>
@@ -762,7 +955,7 @@
           <a:p>
             <a:fld id="{4509A250-FF31-4206-8172-F9D3106AACB1}" type="datetimeFigureOut">
               <a:rPr lang="en-US" dirty="0"/>
-              <a:t>9/28/2021</a:t>
+              <a:t>9/29/2021</a:t>
             </a:fld>
             <a:endParaRPr lang="en-US" dirty="0"/>
           </a:p>
@@ -804,7 +997,7 @@
           <a:p>
             <a:fld id="{D57F1E4F-1CFF-5643-939E-02111984F565}" type="slidenum">
               <a:rPr lang="en-US" dirty="0"/>
-              <a:t>‹Nº›</a:t>
+              <a:t>‹#›</a:t>
             </a:fld>
             <a:endParaRPr lang="en-US" dirty="0"/>
           </a:p>
@@ -1030,7 +1223,7 @@
           <a:p>
             <a:fld id="{4509A250-FF31-4206-8172-F9D3106AACB1}" type="datetimeFigureOut">
               <a:rPr lang="en-US" dirty="0"/>
-              <a:t>9/28/2021</a:t>
+              <a:t>9/29/2021</a:t>
             </a:fld>
             <a:endParaRPr lang="en-US" dirty="0"/>
           </a:p>
@@ -1072,7 +1265,7 @@
           <a:p>
             <a:fld id="{D57F1E4F-1CFF-5643-939E-02111984F565}" type="slidenum">
               <a:rPr lang="en-US" dirty="0"/>
-              <a:t>‹Nº›</a:t>
+              <a:t>‹#›</a:t>
             </a:fld>
             <a:endParaRPr lang="en-US" dirty="0"/>
           </a:p>
@@ -1366,7 +1559,7 @@
           <a:p>
             <a:fld id="{4509A250-FF31-4206-8172-F9D3106AACB1}" type="datetimeFigureOut">
               <a:rPr lang="en-US" dirty="0"/>
-              <a:t>9/28/2021</a:t>
+              <a:t>9/29/2021</a:t>
             </a:fld>
             <a:endParaRPr lang="en-US" dirty="0"/>
           </a:p>
@@ -1408,7 +1601,7 @@
           <a:p>
             <a:fld id="{D57F1E4F-1CFF-5643-939E-02111984F565}" type="slidenum">
               <a:rPr lang="en-US" dirty="0"/>
-              <a:t>‹Nº›</a:t>
+              <a:t>‹#›</a:t>
             </a:fld>
             <a:endParaRPr lang="en-US" dirty="0"/>
           </a:p>
@@ -1984,7 +2177,7 @@
           <a:p>
             <a:fld id="{4509A250-FF31-4206-8172-F9D3106AACB1}" type="datetimeFigureOut">
               <a:rPr lang="en-US" dirty="0"/>
-              <a:t>9/28/2021</a:t>
+              <a:t>9/29/2021</a:t>
             </a:fld>
             <a:endParaRPr lang="en-US" dirty="0"/>
           </a:p>
@@ -2026,7 +2219,7 @@
           <a:p>
             <a:fld id="{D57F1E4F-1CFF-5643-939E-02111984F565}" type="slidenum">
               <a:rPr lang="en-US" dirty="0"/>
-              <a:t>‹Nº›</a:t>
+              <a:t>‹#›</a:t>
             </a:fld>
             <a:endParaRPr lang="en-US" dirty="0"/>
           </a:p>
@@ -2839,7 +3032,7 @@
           <a:p>
             <a:fld id="{4509A250-FF31-4206-8172-F9D3106AACB1}" type="datetimeFigureOut">
               <a:rPr lang="en-US" dirty="0"/>
-              <a:t>9/28/2021</a:t>
+              <a:t>9/29/2021</a:t>
             </a:fld>
             <a:endParaRPr lang="en-US" dirty="0"/>
           </a:p>
@@ -2881,7 +3074,7 @@
           <a:p>
             <a:fld id="{D57F1E4F-1CFF-5643-939E-02111984F565}" type="slidenum">
               <a:rPr lang="en-US" dirty="0"/>
-              <a:t>‹Nº›</a:t>
+              <a:t>‹#›</a:t>
             </a:fld>
             <a:endParaRPr lang="en-US" dirty="0"/>
           </a:p>
@@ -3004,7 +3197,7 @@
           <a:p>
             <a:fld id="{4509A250-FF31-4206-8172-F9D3106AACB1}" type="datetimeFigureOut">
               <a:rPr lang="en-US" dirty="0"/>
-              <a:t>9/28/2021</a:t>
+              <a:t>9/29/2021</a:t>
             </a:fld>
             <a:endParaRPr lang="en-US" dirty="0"/>
           </a:p>
@@ -3046,7 +3239,7 @@
           <a:p>
             <a:fld id="{D57F1E4F-1CFF-5643-939E-02111984F565}" type="slidenum">
               <a:rPr lang="en-US" dirty="0"/>
-              <a:t>‹Nº›</a:t>
+              <a:t>‹#›</a:t>
             </a:fld>
             <a:endParaRPr lang="en-US" dirty="0"/>
           </a:p>
@@ -3179,7 +3372,7 @@
           <a:p>
             <a:fld id="{4509A250-FF31-4206-8172-F9D3106AACB1}" type="datetimeFigureOut">
               <a:rPr lang="en-US" dirty="0"/>
-              <a:t>9/28/2021</a:t>
+              <a:t>9/29/2021</a:t>
             </a:fld>
             <a:endParaRPr lang="en-US" dirty="0"/>
           </a:p>
@@ -3221,7 +3414,7 @@
           <a:p>
             <a:fld id="{D57F1E4F-1CFF-5643-939E-02111984F565}" type="slidenum">
               <a:rPr lang="en-US" dirty="0"/>
-              <a:t>‹Nº›</a:t>
+              <a:t>‹#›</a:t>
             </a:fld>
             <a:endParaRPr lang="en-US" dirty="0"/>
           </a:p>
@@ -3344,7 +3537,7 @@
           <a:p>
             <a:fld id="{4509A250-FF31-4206-8172-F9D3106AACB1}" type="datetimeFigureOut">
               <a:rPr lang="en-US" dirty="0"/>
-              <a:t>9/28/2021</a:t>
+              <a:t>9/29/2021</a:t>
             </a:fld>
             <a:endParaRPr lang="en-US" dirty="0"/>
           </a:p>
@@ -3386,7 +3579,7 @@
           <a:p>
             <a:fld id="{D57F1E4F-1CFF-5643-939E-02111984F565}" type="slidenum">
               <a:rPr lang="en-US" dirty="0"/>
-              <a:t>‹Nº›</a:t>
+              <a:t>‹#›</a:t>
             </a:fld>
             <a:endParaRPr lang="en-US" dirty="0"/>
           </a:p>
@@ -3586,7 +3779,7 @@
           <a:p>
             <a:fld id="{9796027F-7875-4030-9381-8BD8C4F21935}" type="datetimeFigureOut">
               <a:rPr lang="en-US" dirty="0"/>
-              <a:t>9/28/2021</a:t>
+              <a:t>9/29/2021</a:t>
             </a:fld>
             <a:endParaRPr lang="en-US" dirty="0"/>
           </a:p>
@@ -3628,7 +3821,7 @@
           <a:p>
             <a:fld id="{D57F1E4F-1CFF-5643-939E-02111984F565}" type="slidenum">
               <a:rPr lang="en-US" dirty="0"/>
-              <a:t>‹Nº›</a:t>
+              <a:t>‹#›</a:t>
             </a:fld>
             <a:endParaRPr lang="en-US" dirty="0"/>
           </a:p>
@@ -3873,7 +4066,7 @@
           <a:p>
             <a:fld id="{9796027F-7875-4030-9381-8BD8C4F21935}" type="datetimeFigureOut">
               <a:rPr lang="en-US" dirty="0"/>
-              <a:t>9/28/2021</a:t>
+              <a:t>9/29/2021</a:t>
             </a:fld>
             <a:endParaRPr lang="en-US" dirty="0"/>
           </a:p>
@@ -3915,7 +4108,7 @@
           <a:p>
             <a:fld id="{D57F1E4F-1CFF-5643-939E-02111984F565}" type="slidenum">
               <a:rPr lang="en-US" dirty="0"/>
-              <a:t>‹Nº›</a:t>
+              <a:t>‹#›</a:t>
             </a:fld>
             <a:endParaRPr lang="en-US" dirty="0"/>
           </a:p>
@@ -4312,7 +4505,7 @@
           <a:p>
             <a:fld id="{9796027F-7875-4030-9381-8BD8C4F21935}" type="datetimeFigureOut">
               <a:rPr lang="en-US" dirty="0"/>
-              <a:t>9/28/2021</a:t>
+              <a:t>9/29/2021</a:t>
             </a:fld>
             <a:endParaRPr lang="en-US" dirty="0"/>
           </a:p>
@@ -4354,7 +4547,7 @@
           <a:p>
             <a:fld id="{D57F1E4F-1CFF-5643-939E-02111984F565}" type="slidenum">
               <a:rPr lang="en-US" dirty="0"/>
-              <a:t>‹Nº›</a:t>
+              <a:t>‹#›</a:t>
             </a:fld>
             <a:endParaRPr lang="en-US" dirty="0"/>
           </a:p>
@@ -4425,7 +4618,7 @@
           <a:p>
             <a:fld id="{4509A250-FF31-4206-8172-F9D3106AACB1}" type="datetimeFigureOut">
               <a:rPr lang="en-US" dirty="0"/>
-              <a:t>9/28/2021</a:t>
+              <a:t>9/29/2021</a:t>
             </a:fld>
             <a:endParaRPr lang="en-US" dirty="0"/>
           </a:p>
@@ -4467,7 +4660,7 @@
           <a:p>
             <a:fld id="{D57F1E4F-1CFF-5643-939E-02111984F565}" type="slidenum">
               <a:rPr lang="en-US" dirty="0"/>
-              <a:t>‹Nº›</a:t>
+              <a:t>‹#›</a:t>
             </a:fld>
             <a:endParaRPr lang="en-US" dirty="0"/>
           </a:p>
@@ -4515,7 +4708,7 @@
           <a:p>
             <a:fld id="{4509A250-FF31-4206-8172-F9D3106AACB1}" type="datetimeFigureOut">
               <a:rPr lang="en-US" dirty="0"/>
-              <a:t>9/28/2021</a:t>
+              <a:t>9/29/2021</a:t>
             </a:fld>
             <a:endParaRPr lang="en-US" dirty="0"/>
           </a:p>
@@ -4557,7 +4750,7 @@
           <a:p>
             <a:fld id="{D57F1E4F-1CFF-5643-939E-02111984F565}" type="slidenum">
               <a:rPr lang="en-US" dirty="0"/>
-              <a:t>‹Nº›</a:t>
+              <a:t>‹#›</a:t>
             </a:fld>
             <a:endParaRPr lang="en-US" dirty="0"/>
           </a:p>
@@ -4789,7 +4982,7 @@
           <a:p>
             <a:fld id="{4509A250-FF31-4206-8172-F9D3106AACB1}" type="datetimeFigureOut">
               <a:rPr lang="en-US" dirty="0"/>
-              <a:t>9/28/2021</a:t>
+              <a:t>9/29/2021</a:t>
             </a:fld>
             <a:endParaRPr lang="en-US" dirty="0"/>
           </a:p>
@@ -4831,7 +5024,7 @@
           <a:p>
             <a:fld id="{D57F1E4F-1CFF-5643-939E-02111984F565}" type="slidenum">
               <a:rPr lang="en-US" dirty="0"/>
-              <a:t>‹Nº›</a:t>
+              <a:t>‹#›</a:t>
             </a:fld>
             <a:endParaRPr lang="en-US" dirty="0"/>
           </a:p>
@@ -5059,7 +5252,7 @@
           <a:p>
             <a:fld id="{4509A250-FF31-4206-8172-F9D3106AACB1}" type="datetimeFigureOut">
               <a:rPr lang="en-US" dirty="0"/>
-              <a:t>9/28/2021</a:t>
+              <a:t>9/29/2021</a:t>
             </a:fld>
             <a:endParaRPr lang="en-US" dirty="0"/>
           </a:p>
@@ -5101,7 +5294,7 @@
           <a:p>
             <a:fld id="{D57F1E4F-1CFF-5643-939E-02111984F565}" type="slidenum">
               <a:rPr lang="en-US" dirty="0"/>
-              <a:t>‹Nº›</a:t>
+              <a:t>‹#›</a:t>
             </a:fld>
             <a:endParaRPr lang="en-US" dirty="0"/>
           </a:p>
@@ -5483,7 +5676,7 @@
           <a:p>
             <a:fld id="{4AAD347D-5ACD-4C99-B74B-A9C85AD731AF}" type="datetimeFigureOut">
               <a:rPr lang="en-US" dirty="0"/>
-              <a:t>9/28/2021</a:t>
+              <a:t>9/29/2021</a:t>
             </a:fld>
             <a:endParaRPr lang="en-US" dirty="0"/>
           </a:p>
@@ -5562,7 +5755,7 @@
           <a:p>
             <a:fld id="{D57F1E4F-1CFF-5643-939E-02111984F565}" type="slidenum">
               <a:rPr lang="en-US" dirty="0"/>
-              <a:t>‹Nº›</a:t>
+              <a:t>‹#›</a:t>
             </a:fld>
             <a:endParaRPr lang="en-US" dirty="0"/>
           </a:p>
@@ -6220,7 +6413,350 @@
           <a:p>
             <a:r>
               <a:rPr lang="es-ES" dirty="0"/>
-              <a:t>Parte Oscar</a:t>
+              <a:t>Evaluación</a:t>
+            </a:r>
+          </a:p>
+        </p:txBody>
+      </p:sp>
+      <p:pic>
+        <p:nvPicPr>
+          <p:cNvPr id="4" name="Imagen 94">
+            <a:extLst>
+              <a:ext uri="{FF2B5EF4-FFF2-40B4-BE49-F238E27FC236}">
+                <a16:creationId xmlns:a16="http://schemas.microsoft.com/office/drawing/2014/main" id="{F0B47B76-90E7-4CB7-BD85-0B7EB2A11EB6}"/>
+              </a:ext>
+            </a:extLst>
+          </p:cNvPr>
+          <p:cNvPicPr/>
+          <p:nvPr/>
+        </p:nvPicPr>
+        <p:blipFill>
+          <a:blip r:embed="rId2">
+            <a:extLst>
+              <a:ext uri="{28A0092B-C50C-407E-A947-70E740481C1C}">
+                <a14:useLocalDpi xmlns:a14="http://schemas.microsoft.com/office/drawing/2010/main" val="0"/>
+              </a:ext>
+            </a:extLst>
+          </a:blip>
+          <a:srcRect/>
+          <a:stretch>
+            <a:fillRect/>
+          </a:stretch>
+        </p:blipFill>
+        <p:spPr bwMode="auto">
+          <a:xfrm>
+            <a:off x="1411659" y="1458911"/>
+            <a:ext cx="9368682" cy="4320787"/>
+          </a:xfrm>
+          <a:prstGeom prst="rect">
+            <a:avLst/>
+          </a:prstGeom>
+          <a:noFill/>
+          <a:ln>
+            <a:noFill/>
+          </a:ln>
+        </p:spPr>
+      </p:pic>
+      <p:sp>
+        <p:nvSpPr>
+          <p:cNvPr id="5" name="CuadroTexto 12">
+            <a:extLst>
+              <a:ext uri="{FF2B5EF4-FFF2-40B4-BE49-F238E27FC236}">
+                <a16:creationId xmlns:a16="http://schemas.microsoft.com/office/drawing/2014/main" id="{63D45A89-A00D-458A-8126-A0372F28BDA6}"/>
+              </a:ext>
+            </a:extLst>
+          </p:cNvPr>
+          <p:cNvSpPr txBox="1"/>
+          <p:nvPr/>
+        </p:nvSpPr>
+        <p:spPr>
+          <a:xfrm>
+            <a:off x="1411659" y="5943617"/>
+            <a:ext cx="9586306" cy="646331"/>
+          </a:xfrm>
+          <a:prstGeom prst="rect">
+            <a:avLst/>
+          </a:prstGeom>
+          <a:noFill/>
+        </p:spPr>
+        <p:txBody>
+          <a:bodyPr wrap="square" rtlCol="0">
+            <a:spAutoFit/>
+          </a:bodyPr>
+          <a:lstStyle/>
+          <a:p>
+            <a:pPr marL="285750" indent="-285750">
+              <a:buFont typeface="Arial" panose="020B0604020202020204" pitchFamily="34" charset="0"/>
+              <a:buChar char="•"/>
+            </a:pPr>
+            <a:r>
+              <a:rPr lang="es-ES" dirty="0"/>
+              <a:t> El RMSE del modelo bordea las 45 unidades. Un </a:t>
+            </a:r>
+            <a:r>
+              <a:rPr lang="es-ES" b="1" dirty="0"/>
+              <a:t>error</a:t>
+            </a:r>
+            <a:r>
+              <a:rPr lang="es-ES" dirty="0"/>
+              <a:t> </a:t>
+            </a:r>
+            <a:r>
+              <a:rPr lang="es-ES" b="1" dirty="0"/>
+              <a:t>considerable pero no alarmante</a:t>
+            </a:r>
+            <a:r>
+              <a:rPr lang="es-ES" dirty="0"/>
+              <a:t>: el valor máximo del precio de apertura supera las 300 unidades.</a:t>
+            </a:r>
+          </a:p>
+        </p:txBody>
+      </p:sp>
+    </p:spTree>
+    <p:extLst>
+      <p:ext uri="{BB962C8B-B14F-4D97-AF65-F5344CB8AC3E}">
+        <p14:creationId xmlns:p14="http://schemas.microsoft.com/office/powerpoint/2010/main" val="3183832166"/>
+      </p:ext>
+    </p:extLst>
+  </p:cSld>
+  <p:clrMapOvr>
+    <a:masterClrMapping/>
+  </p:clrMapOvr>
+</p:sld>
+</file>
+
+<file path=ppt/slides/slide12.xml><?xml version="1.0" encoding="utf-8"?>
+<p:sld xmlns:a="http://schemas.openxmlformats.org/drawingml/2006/main" xmlns:r="http://schemas.openxmlformats.org/officeDocument/2006/relationships" xmlns:p="http://schemas.openxmlformats.org/presentationml/2006/main">
+  <p:cSld>
+    <p:spTree>
+      <p:nvGrpSpPr>
+        <p:cNvPr id="1" name=""/>
+        <p:cNvGrpSpPr/>
+        <p:nvPr/>
+      </p:nvGrpSpPr>
+      <p:grpSpPr>
+        <a:xfrm>
+          <a:off x="0" y="0"/>
+          <a:ext cx="0" cy="0"/>
+          <a:chOff x="0" y="0"/>
+          <a:chExt cx="0" cy="0"/>
+        </a:xfrm>
+      </p:grpSpPr>
+      <p:sp>
+        <p:nvSpPr>
+          <p:cNvPr id="2" name="Título 1">
+            <a:extLst>
+              <a:ext uri="{FF2B5EF4-FFF2-40B4-BE49-F238E27FC236}">
+                <a16:creationId xmlns:a16="http://schemas.microsoft.com/office/drawing/2014/main" id="{382C1579-1660-4D0C-9EF8-2B0352D3B61D}"/>
+              </a:ext>
+            </a:extLst>
+          </p:cNvPr>
+          <p:cNvSpPr>
+            <a:spLocks noGrp="1"/>
+          </p:cNvSpPr>
+          <p:nvPr>
+            <p:ph type="title"/>
+          </p:nvPr>
+        </p:nvSpPr>
+        <p:spPr/>
+        <p:txBody>
+          <a:bodyPr/>
+          <a:lstStyle/>
+          <a:p>
+            <a:r>
+              <a:rPr lang="es-ES" dirty="0"/>
+              <a:t>Resultados</a:t>
+            </a:r>
+          </a:p>
+        </p:txBody>
+      </p:sp>
+      <p:pic>
+        <p:nvPicPr>
+          <p:cNvPr id="6" name="그림 74">
+            <a:extLst>
+              <a:ext uri="{FF2B5EF4-FFF2-40B4-BE49-F238E27FC236}">
+                <a16:creationId xmlns:a16="http://schemas.microsoft.com/office/drawing/2014/main" id="{19A1DD0B-D38C-45B1-92D7-7B28267CE6EB}"/>
+              </a:ext>
+            </a:extLst>
+          </p:cNvPr>
+          <p:cNvPicPr/>
+          <p:nvPr/>
+        </p:nvPicPr>
+        <p:blipFill>
+          <a:blip r:embed="rId2">
+            <a:extLst>
+              <a:ext uri="{28A0092B-C50C-407E-A947-70E740481C1C}">
+                <a14:useLocalDpi xmlns:a14="http://schemas.microsoft.com/office/drawing/2010/main" val="0"/>
+              </a:ext>
+            </a:extLst>
+          </a:blip>
+          <a:srcRect/>
+          <a:stretch>
+            <a:fillRect/>
+          </a:stretch>
+        </p:blipFill>
+        <p:spPr bwMode="auto">
+          <a:xfrm>
+            <a:off x="832006" y="1350543"/>
+            <a:ext cx="4570256" cy="4156913"/>
+          </a:xfrm>
+          <a:prstGeom prst="rect">
+            <a:avLst/>
+          </a:prstGeom>
+          <a:noFill/>
+          <a:ln>
+            <a:noFill/>
+          </a:ln>
+        </p:spPr>
+      </p:pic>
+      <p:sp>
+        <p:nvSpPr>
+          <p:cNvPr id="7" name="CuadroTexto 12">
+            <a:extLst>
+              <a:ext uri="{FF2B5EF4-FFF2-40B4-BE49-F238E27FC236}">
+                <a16:creationId xmlns:a16="http://schemas.microsoft.com/office/drawing/2014/main" id="{46E36B8D-8643-480E-96EF-59A3C8BE260F}"/>
+              </a:ext>
+            </a:extLst>
+          </p:cNvPr>
+          <p:cNvSpPr txBox="1"/>
+          <p:nvPr/>
+        </p:nvSpPr>
+        <p:spPr>
+          <a:xfrm>
+            <a:off x="646111" y="5805116"/>
+            <a:ext cx="5193972" cy="923330"/>
+          </a:xfrm>
+          <a:prstGeom prst="rect">
+            <a:avLst/>
+          </a:prstGeom>
+          <a:noFill/>
+        </p:spPr>
+        <p:txBody>
+          <a:bodyPr wrap="square" rtlCol="0">
+            <a:spAutoFit/>
+          </a:bodyPr>
+          <a:lstStyle/>
+          <a:p>
+            <a:pPr marL="285750" indent="-285750">
+              <a:buFont typeface="Arial" panose="020B0604020202020204" pitchFamily="34" charset="0"/>
+              <a:buChar char="•"/>
+            </a:pPr>
+            <a:r>
+              <a:rPr lang="es-ES" dirty="0"/>
+              <a:t> Matriz de correlaciones. Aquellas variables con más relación son aquellas relacionadas a </a:t>
+            </a:r>
+            <a:r>
+              <a:rPr lang="es-ES" dirty="0" err="1"/>
+              <a:t>BERT_title_likes</a:t>
+            </a:r>
+            <a:r>
+              <a:rPr lang="es-ES" dirty="0"/>
+              <a:t>.</a:t>
+            </a:r>
+          </a:p>
+        </p:txBody>
+      </p:sp>
+      <p:pic>
+        <p:nvPicPr>
+          <p:cNvPr id="1026" name="Picture 2">
+            <a:extLst>
+              <a:ext uri="{FF2B5EF4-FFF2-40B4-BE49-F238E27FC236}">
+                <a16:creationId xmlns:a16="http://schemas.microsoft.com/office/drawing/2014/main" id="{1AFA8586-0C29-4254-AFB0-BA0073495519}"/>
+              </a:ext>
+            </a:extLst>
+          </p:cNvPr>
+          <p:cNvPicPr>
+            <a:picLocks noChangeAspect="1" noChangeArrowheads="1"/>
+          </p:cNvPicPr>
+          <p:nvPr/>
+        </p:nvPicPr>
+        <p:blipFill>
+          <a:blip r:embed="rId3">
+            <a:extLst>
+              <a:ext uri="{28A0092B-C50C-407E-A947-70E740481C1C}">
+                <a14:useLocalDpi xmlns:a14="http://schemas.microsoft.com/office/drawing/2010/main" val="0"/>
+              </a:ext>
+            </a:extLst>
+          </a:blip>
+          <a:srcRect/>
+          <a:stretch>
+            <a:fillRect/>
+          </a:stretch>
+        </p:blipFill>
+        <p:spPr bwMode="auto">
+          <a:xfrm>
+            <a:off x="5981511" y="1224105"/>
+            <a:ext cx="5564378" cy="4409788"/>
+          </a:xfrm>
+          <a:prstGeom prst="rect">
+            <a:avLst/>
+          </a:prstGeom>
+          <a:noFill/>
+          <a:extLst>
+            <a:ext uri="{909E8E84-426E-40DD-AFC4-6F175D3DCCD1}">
+              <a14:hiddenFill xmlns:a14="http://schemas.microsoft.com/office/drawing/2010/main">
+                <a:solidFill>
+                  <a:srgbClr val="FFFFFF"/>
+                </a:solidFill>
+              </a14:hiddenFill>
+            </a:ext>
+          </a:extLst>
+        </p:spPr>
+      </p:pic>
+    </p:spTree>
+    <p:extLst>
+      <p:ext uri="{BB962C8B-B14F-4D97-AF65-F5344CB8AC3E}">
+        <p14:creationId xmlns:p14="http://schemas.microsoft.com/office/powerpoint/2010/main" val="1142920165"/>
+      </p:ext>
+    </p:extLst>
+  </p:cSld>
+  <p:clrMapOvr>
+    <a:masterClrMapping/>
+  </p:clrMapOvr>
+</p:sld>
+</file>
+
+<file path=ppt/slides/slide13.xml><?xml version="1.0" encoding="utf-8"?>
+<p:sld xmlns:a="http://schemas.openxmlformats.org/drawingml/2006/main" xmlns:r="http://schemas.openxmlformats.org/officeDocument/2006/relationships" xmlns:p="http://schemas.openxmlformats.org/presentationml/2006/main">
+  <p:cSld>
+    <p:spTree>
+      <p:nvGrpSpPr>
+        <p:cNvPr id="1" name=""/>
+        <p:cNvGrpSpPr/>
+        <p:nvPr/>
+      </p:nvGrpSpPr>
+      <p:grpSpPr>
+        <a:xfrm>
+          <a:off x="0" y="0"/>
+          <a:ext cx="0" cy="0"/>
+          <a:chOff x="0" y="0"/>
+          <a:chExt cx="0" cy="0"/>
+        </a:xfrm>
+      </p:grpSpPr>
+      <p:sp>
+        <p:nvSpPr>
+          <p:cNvPr id="2" name="Título 1">
+            <a:extLst>
+              <a:ext uri="{FF2B5EF4-FFF2-40B4-BE49-F238E27FC236}">
+                <a16:creationId xmlns:a16="http://schemas.microsoft.com/office/drawing/2014/main" id="{382C1579-1660-4D0C-9EF8-2B0352D3B61D}"/>
+              </a:ext>
+            </a:extLst>
+          </p:cNvPr>
+          <p:cNvSpPr>
+            <a:spLocks noGrp="1"/>
+          </p:cNvSpPr>
+          <p:nvPr>
+            <p:ph type="title"/>
+          </p:nvPr>
+        </p:nvSpPr>
+        <p:spPr/>
+        <p:txBody>
+          <a:bodyPr/>
+          <a:lstStyle/>
+          <a:p>
+            <a:r>
+              <a:rPr lang="es-ES" dirty="0"/>
+              <a:t>Conclusiones y trabajo futuro</a:t>
             </a:r>
           </a:p>
         </p:txBody>
@@ -6241,11 +6777,179 @@
             <p:ph idx="1"/>
           </p:nvPr>
         </p:nvSpPr>
-        <p:spPr/>
+        <p:spPr>
+          <a:xfrm>
+            <a:off x="1104293" y="1561212"/>
+            <a:ext cx="8946541" cy="4195481"/>
+          </a:xfrm>
+        </p:spPr>
         <p:txBody>
           <a:bodyPr/>
           <a:lstStyle/>
           <a:p>
+            <a:r>
+              <a:rPr lang="es-ES" dirty="0"/>
+              <a:t>Nuestro modelo parece prometedor con ciertas implementaciones pero a día de hoy no logra obtener resultados tan precisos como nos gustaría.</a:t>
+            </a:r>
+          </a:p>
+          <a:p>
+            <a:r>
+              <a:rPr lang="es-ES" dirty="0"/>
+              <a:t>Las principales dos mejoras a implementar son:</a:t>
+            </a:r>
+          </a:p>
+          <a:p>
+            <a:pPr lvl="1"/>
+            <a:r>
+              <a:rPr lang="es-ES" dirty="0"/>
+              <a:t>Optimización del método de </a:t>
+            </a:r>
+            <a:r>
+              <a:rPr lang="es-ES" dirty="0" err="1"/>
+              <a:t>Prunning</a:t>
+            </a:r>
+            <a:r>
+              <a:rPr lang="es-ES" dirty="0"/>
+              <a:t> (podar el árbol) mediante validación cruzada.</a:t>
+            </a:r>
+          </a:p>
+          <a:p>
+            <a:pPr lvl="1"/>
+            <a:r>
+              <a:rPr lang="es-ES" dirty="0"/>
+              <a:t>La incorporación de otras variables al modelo. Muchos de los comentarios del </a:t>
+            </a:r>
+            <a:r>
+              <a:rPr lang="es-ES" dirty="0" err="1"/>
+              <a:t>dataset</a:t>
+            </a:r>
+            <a:r>
+              <a:rPr lang="es-ES" dirty="0"/>
+              <a:t> son imágenes y vídeos.</a:t>
+            </a:r>
+          </a:p>
+        </p:txBody>
+      </p:sp>
+      <p:pic>
+        <p:nvPicPr>
+          <p:cNvPr id="4" name="Picture 3">
+            <a:extLst>
+              <a:ext uri="{FF2B5EF4-FFF2-40B4-BE49-F238E27FC236}">
+                <a16:creationId xmlns:a16="http://schemas.microsoft.com/office/drawing/2014/main" id="{089535EA-B039-4098-9523-1336FA90CE45}"/>
+              </a:ext>
+            </a:extLst>
+          </p:cNvPr>
+          <p:cNvPicPr/>
+          <p:nvPr/>
+        </p:nvPicPr>
+        <p:blipFill>
+          <a:blip r:embed="rId2">
+            <a:extLst>
+              <a:ext uri="{28A0092B-C50C-407E-A947-70E740481C1C}">
+                <a14:useLocalDpi xmlns:a14="http://schemas.microsoft.com/office/drawing/2010/main" val="0"/>
+              </a:ext>
+            </a:extLst>
+          </a:blip>
+          <a:srcRect/>
+          <a:stretch>
+            <a:fillRect/>
+          </a:stretch>
+        </p:blipFill>
+        <p:spPr bwMode="auto">
+          <a:xfrm>
+            <a:off x="3208713" y="4551976"/>
+            <a:ext cx="2858848" cy="1853306"/>
+          </a:xfrm>
+          <a:prstGeom prst="rect">
+            <a:avLst/>
+          </a:prstGeom>
+          <a:noFill/>
+          <a:ln>
+            <a:noFill/>
+          </a:ln>
+        </p:spPr>
+      </p:pic>
+      <p:pic>
+        <p:nvPicPr>
+          <p:cNvPr id="5" name="Picture 4">
+            <a:extLst>
+              <a:ext uri="{FF2B5EF4-FFF2-40B4-BE49-F238E27FC236}">
+                <a16:creationId xmlns:a16="http://schemas.microsoft.com/office/drawing/2014/main" id="{54FDBDC1-466F-4307-A604-A30DEA35B2B2}"/>
+              </a:ext>
+            </a:extLst>
+          </p:cNvPr>
+          <p:cNvPicPr/>
+          <p:nvPr/>
+        </p:nvPicPr>
+        <p:blipFill>
+          <a:blip r:embed="rId3">
+            <a:extLst>
+              <a:ext uri="{28A0092B-C50C-407E-A947-70E740481C1C}">
+                <a14:useLocalDpi xmlns:a14="http://schemas.microsoft.com/office/drawing/2010/main" val="0"/>
+              </a:ext>
+            </a:extLst>
+          </a:blip>
+          <a:srcRect/>
+          <a:stretch>
+            <a:fillRect/>
+          </a:stretch>
+        </p:blipFill>
+        <p:spPr bwMode="auto">
+          <a:xfrm>
+            <a:off x="7553864" y="4134026"/>
+            <a:ext cx="3073604" cy="2325523"/>
+          </a:xfrm>
+          <a:prstGeom prst="rect">
+            <a:avLst/>
+          </a:prstGeom>
+          <a:noFill/>
+          <a:ln>
+            <a:noFill/>
+          </a:ln>
+        </p:spPr>
+      </p:pic>
+      <p:sp>
+        <p:nvSpPr>
+          <p:cNvPr id="8" name="Arrow: Right 7">
+            <a:extLst>
+              <a:ext uri="{FF2B5EF4-FFF2-40B4-BE49-F238E27FC236}">
+                <a16:creationId xmlns:a16="http://schemas.microsoft.com/office/drawing/2014/main" id="{51236801-5F83-484D-B546-4FB61C4E7B62}"/>
+              </a:ext>
+            </a:extLst>
+          </p:cNvPr>
+          <p:cNvSpPr/>
+          <p:nvPr/>
+        </p:nvSpPr>
+        <p:spPr>
+          <a:xfrm>
+            <a:off x="6211019" y="5365630"/>
+            <a:ext cx="1227826" cy="310551"/>
+          </a:xfrm>
+          <a:prstGeom prst="rightArrow">
+            <a:avLst/>
+          </a:prstGeom>
+        </p:spPr>
+        <p:style>
+          <a:lnRef idx="2">
+            <a:schemeClr val="accent1">
+              <a:shade val="50000"/>
+            </a:schemeClr>
+          </a:lnRef>
+          <a:fillRef idx="1">
+            <a:schemeClr val="accent1"/>
+          </a:fillRef>
+          <a:effectRef idx="0">
+            <a:schemeClr val="accent1"/>
+          </a:effectRef>
+          <a:fontRef idx="minor">
+            <a:schemeClr val="lt1"/>
+          </a:fontRef>
+        </p:style>
+        <p:txBody>
+          <a:bodyPr rtlCol="0" anchor="ctr"/>
+          <a:lstStyle/>
+          <a:p>
+            <a:pPr algn="ctr"/>
             <a:endParaRPr lang="es-ES"/>
           </a:p>
         </p:txBody>
@@ -6253,7 +6957,7 @@
     </p:spTree>
     <p:extLst>
       <p:ext uri="{BB962C8B-B14F-4D97-AF65-F5344CB8AC3E}">
-        <p14:creationId xmlns:p14="http://schemas.microsoft.com/office/powerpoint/2010/main" val="3183832166"/>
+        <p14:creationId xmlns:p14="http://schemas.microsoft.com/office/powerpoint/2010/main" val="2558987691"/>
       </p:ext>
     </p:extLst>
   </p:cSld>

</xml_diff>